<commit_message>
Changed font and changed data text color
</commit_message>
<xml_diff>
--- a/graphics_and_templates/template.pptx
+++ b/graphics_and_templates/template.pptx
@@ -210,7 +210,7 @@
           <a:p>
             <a:fld id="{D93625D4-FB5C-B040-BF47-5145EF22A59C}" type="datetimeFigureOut">
               <a:rPr lang="en-US" smtClean="0"/>
-              <a:t>9/12/2019</a:t>
+              <a:t>3/11/2020</a:t>
             </a:fld>
             <a:endParaRPr lang="en-US"/>
           </a:p>
@@ -602,7 +602,7 @@
                 <a:solidFill>
                   <a:srgbClr val="990000"/>
                 </a:solidFill>
-                <a:latin typeface="Acumin Pro Thin" panose="020B0204020202020204" pitchFamily="34" charset="0"/>
+                <a:latin typeface="Avenir Next LT Pro Light" panose="020B0304020202020204" pitchFamily="34" charset="0"/>
               </a:defRPr>
             </a:lvl1pPr>
             <a:lvl2pPr algn="ctr">
@@ -610,7 +610,7 @@
                 <a:solidFill>
                   <a:srgbClr val="990000"/>
                 </a:solidFill>
-                <a:latin typeface="Acumin Pro Thin" panose="020B0204020202020204" pitchFamily="34" charset="0"/>
+                <a:latin typeface="Avenir Next LT Pro Light" panose="020B0304020202020204" pitchFamily="34" charset="0"/>
               </a:defRPr>
             </a:lvl2pPr>
             <a:lvl3pPr algn="ctr">
@@ -618,7 +618,7 @@
                 <a:solidFill>
                   <a:srgbClr val="990000"/>
                 </a:solidFill>
-                <a:latin typeface="Acumin Pro Thin" panose="020B0204020202020204" pitchFamily="34" charset="0"/>
+                <a:latin typeface="Avenir Next LT Pro Light" panose="020B0304020202020204" pitchFamily="34" charset="0"/>
               </a:defRPr>
             </a:lvl3pPr>
             <a:lvl4pPr algn="ctr">
@@ -626,7 +626,7 @@
                 <a:solidFill>
                   <a:srgbClr val="990000"/>
                 </a:solidFill>
-                <a:latin typeface="Acumin Pro Thin" panose="020B0204020202020204" pitchFamily="34" charset="0"/>
+                <a:latin typeface="Avenir Next LT Pro Light" panose="020B0304020202020204" pitchFamily="34" charset="0"/>
               </a:defRPr>
             </a:lvl4pPr>
             <a:lvl5pPr algn="ctr">
@@ -634,7 +634,7 @@
                 <a:solidFill>
                   <a:srgbClr val="990000"/>
                 </a:solidFill>
-                <a:latin typeface="Acumin Pro Thin" panose="020B0204020202020204" pitchFamily="34" charset="0"/>
+                <a:latin typeface="Avenir Next LT Pro Light" panose="020B0304020202020204" pitchFamily="34" charset="0"/>
               </a:defRPr>
             </a:lvl5pPr>
           </a:lstStyle>
@@ -704,53 +704,53 @@
           <a:bodyPr/>
           <a:lstStyle>
             <a:lvl1pPr algn="ctr">
-              <a:defRPr sz="2000">
+              <a:defRPr sz="2400">
                 <a:solidFill>
                   <a:schemeClr val="bg1">
-                    <a:lumMod val="75000"/>
+                    <a:lumMod val="65000"/>
                   </a:schemeClr>
                 </a:solidFill>
-                <a:latin typeface="Acumin Pro Light" panose="020B0404020202020204" pitchFamily="34" charset="0"/>
+                <a:latin typeface="Avenir Next LT Pro Light" panose="020B0304020202020204" pitchFamily="34" charset="0"/>
               </a:defRPr>
             </a:lvl1pPr>
             <a:lvl2pPr algn="ctr">
-              <a:defRPr sz="2000">
+              <a:defRPr sz="2400">
                 <a:solidFill>
                   <a:schemeClr val="bg1">
-                    <a:lumMod val="75000"/>
+                    <a:lumMod val="65000"/>
                   </a:schemeClr>
                 </a:solidFill>
-                <a:latin typeface="Acumin Pro Light" panose="020B0404020202020204" pitchFamily="34" charset="0"/>
+                <a:latin typeface="Avenir Next LT Pro Light" panose="020B0304020202020204" pitchFamily="34" charset="0"/>
               </a:defRPr>
             </a:lvl2pPr>
             <a:lvl3pPr algn="ctr">
-              <a:defRPr sz="2000">
+              <a:defRPr sz="2400">
                 <a:solidFill>
                   <a:schemeClr val="bg1">
-                    <a:lumMod val="75000"/>
+                    <a:lumMod val="65000"/>
                   </a:schemeClr>
                 </a:solidFill>
-                <a:latin typeface="Acumin Pro Light" panose="020B0404020202020204" pitchFamily="34" charset="0"/>
+                <a:latin typeface="Avenir Next LT Pro Light" panose="020B0304020202020204" pitchFamily="34" charset="0"/>
               </a:defRPr>
             </a:lvl3pPr>
             <a:lvl4pPr algn="ctr">
-              <a:defRPr sz="2000">
+              <a:defRPr sz="2400">
                 <a:solidFill>
                   <a:schemeClr val="bg1">
-                    <a:lumMod val="75000"/>
+                    <a:lumMod val="65000"/>
                   </a:schemeClr>
                 </a:solidFill>
-                <a:latin typeface="Acumin Pro Light" panose="020B0404020202020204" pitchFamily="34" charset="0"/>
+                <a:latin typeface="Avenir Next LT Pro Light" panose="020B0304020202020204" pitchFamily="34" charset="0"/>
               </a:defRPr>
             </a:lvl4pPr>
             <a:lvl5pPr algn="ctr">
-              <a:defRPr sz="2000">
+              <a:defRPr sz="2400">
                 <a:solidFill>
                   <a:schemeClr val="bg1">
-                    <a:lumMod val="75000"/>
+                    <a:lumMod val="65000"/>
                   </a:schemeClr>
                 </a:solidFill>
-                <a:latin typeface="Acumin Pro Light" panose="020B0404020202020204" pitchFamily="34" charset="0"/>
+                <a:latin typeface="Avenir Next LT Pro Light" panose="020B0304020202020204" pitchFamily="34" charset="0"/>
               </a:defRPr>
             </a:lvl5pPr>
           </a:lstStyle>
@@ -892,7 +892,7 @@
                 <a:solidFill>
                   <a:srgbClr val="990000"/>
                 </a:solidFill>
-                <a:latin typeface="Acumin Pro Thin" panose="020B0204020202020204" pitchFamily="34" charset="0"/>
+                <a:latin typeface="Avenir Next LT Pro Light" panose="020B0304020202020204" pitchFamily="34" charset="0"/>
               </a:defRPr>
             </a:lvl1pPr>
             <a:lvl2pPr algn="l">
@@ -900,7 +900,7 @@
                 <a:solidFill>
                   <a:srgbClr val="990000"/>
                 </a:solidFill>
-                <a:latin typeface="Acumin Pro Thin" panose="020B0204020202020204" pitchFamily="34" charset="0"/>
+                <a:latin typeface="Avenir Next LT Pro Light" panose="020B0304020202020204" pitchFamily="34" charset="0"/>
               </a:defRPr>
             </a:lvl2pPr>
             <a:lvl3pPr algn="l">
@@ -908,7 +908,7 @@
                 <a:solidFill>
                   <a:srgbClr val="990000"/>
                 </a:solidFill>
-                <a:latin typeface="Acumin Pro Thin" panose="020B0204020202020204" pitchFamily="34" charset="0"/>
+                <a:latin typeface="Avenir Next LT Pro Light" panose="020B0304020202020204" pitchFamily="34" charset="0"/>
               </a:defRPr>
             </a:lvl3pPr>
             <a:lvl4pPr algn="l">
@@ -916,7 +916,7 @@
                 <a:solidFill>
                   <a:srgbClr val="990000"/>
                 </a:solidFill>
-                <a:latin typeface="Acumin Pro Thin" panose="020B0204020202020204" pitchFamily="34" charset="0"/>
+                <a:latin typeface="Avenir Next LT Pro Light" panose="020B0304020202020204" pitchFamily="34" charset="0"/>
               </a:defRPr>
             </a:lvl4pPr>
             <a:lvl5pPr algn="l">
@@ -924,7 +924,7 @@
                 <a:solidFill>
                   <a:srgbClr val="990000"/>
                 </a:solidFill>
-                <a:latin typeface="Acumin Pro Thin" panose="020B0204020202020204" pitchFamily="34" charset="0"/>
+                <a:latin typeface="Avenir Next LT Pro Light" panose="020B0304020202020204" pitchFamily="34" charset="0"/>
               </a:defRPr>
             </a:lvl5pPr>
           </a:lstStyle>
@@ -995,27 +995,27 @@
           <a:lstStyle>
             <a:lvl1pPr>
               <a:defRPr sz="2400">
-                <a:latin typeface="Acumin Pro Light" panose="020B0404020202020204" pitchFamily="34" charset="0"/>
+                <a:latin typeface="Avenir Next LT Pro Light" panose="020B0304020202020204" pitchFamily="34" charset="0"/>
               </a:defRPr>
             </a:lvl1pPr>
             <a:lvl2pPr>
               <a:defRPr sz="2400">
-                <a:latin typeface="Acumin Pro Light" panose="020B0404020202020204" pitchFamily="34" charset="0"/>
+                <a:latin typeface="Avenir Next LT Pro Light" panose="020B0304020202020204" pitchFamily="34" charset="0"/>
               </a:defRPr>
             </a:lvl2pPr>
             <a:lvl3pPr>
               <a:defRPr sz="2400">
-                <a:latin typeface="Acumin Pro Light" panose="020B0404020202020204" pitchFamily="34" charset="0"/>
+                <a:latin typeface="Avenir Next LT Pro Light" panose="020B0304020202020204" pitchFamily="34" charset="0"/>
               </a:defRPr>
             </a:lvl3pPr>
             <a:lvl4pPr>
               <a:defRPr sz="2400">
-                <a:latin typeface="Acumin Pro Light" panose="020B0404020202020204" pitchFamily="34" charset="0"/>
+                <a:latin typeface="Avenir Next LT Pro Light" panose="020B0304020202020204" pitchFamily="34" charset="0"/>
               </a:defRPr>
             </a:lvl4pPr>
             <a:lvl5pPr>
               <a:defRPr sz="2400">
-                <a:latin typeface="Acumin Pro Light" panose="020B0404020202020204" pitchFamily="34" charset="0"/>
+                <a:latin typeface="Avenir Next LT Pro Light" panose="020B0304020202020204" pitchFamily="34" charset="0"/>
               </a:defRPr>
             </a:lvl5pPr>
           </a:lstStyle>
@@ -1162,7 +1162,7 @@
                 <a:solidFill>
                   <a:srgbClr val="990000"/>
                 </a:solidFill>
-                <a:latin typeface="Acumin Pro Thin" panose="020B0204020202020204" pitchFamily="34" charset="0"/>
+                <a:latin typeface="Avenir Next LT Pro Light" panose="020B0304020202020204" pitchFamily="34" charset="0"/>
               </a:defRPr>
             </a:lvl1pPr>
             <a:lvl2pPr algn="l">
@@ -1170,7 +1170,7 @@
                 <a:solidFill>
                   <a:srgbClr val="990000"/>
                 </a:solidFill>
-                <a:latin typeface="Acumin Pro Thin" panose="020B0204020202020204" pitchFamily="34" charset="0"/>
+                <a:latin typeface="Avenir Next LT Pro Light" panose="020B0304020202020204" pitchFamily="34" charset="0"/>
               </a:defRPr>
             </a:lvl2pPr>
             <a:lvl3pPr algn="l">
@@ -1178,7 +1178,7 @@
                 <a:solidFill>
                   <a:srgbClr val="990000"/>
                 </a:solidFill>
-                <a:latin typeface="Acumin Pro Thin" panose="020B0204020202020204" pitchFamily="34" charset="0"/>
+                <a:latin typeface="Avenir Next LT Pro Light" panose="020B0304020202020204" pitchFamily="34" charset="0"/>
               </a:defRPr>
             </a:lvl3pPr>
             <a:lvl4pPr algn="l">
@@ -1186,7 +1186,7 @@
                 <a:solidFill>
                   <a:srgbClr val="990000"/>
                 </a:solidFill>
-                <a:latin typeface="Acumin Pro Thin" panose="020B0204020202020204" pitchFamily="34" charset="0"/>
+                <a:latin typeface="Avenir Next LT Pro Light" panose="020B0304020202020204" pitchFamily="34" charset="0"/>
               </a:defRPr>
             </a:lvl4pPr>
             <a:lvl5pPr algn="l">
@@ -1194,7 +1194,7 @@
                 <a:solidFill>
                   <a:srgbClr val="990000"/>
                 </a:solidFill>
-                <a:latin typeface="Acumin Pro Thin" panose="020B0204020202020204" pitchFamily="34" charset="0"/>
+                <a:latin typeface="Avenir Next LT Pro Light" panose="020B0304020202020204" pitchFamily="34" charset="0"/>
               </a:defRPr>
             </a:lvl5pPr>
           </a:lstStyle>

</xml_diff>